<commit_message>
Implement Creative Marketing Agent (Phases 1-3)
- Phase 1: Foundation & Creative Focus
  - Enhanced prompts for Research, Analysis, and Presentation agents.
  - Added 'Creative Director' persona to Analysis Service.
  - Implemented custom PPTX layouts with logo integration.

- Phase 2: Multi-Model Intelligence
  - Added GeminiResearchService (Dual-Source Research).
  - Added ResearchConsolidator (Perplexity + Gemini synthesis).
  - Added MultiAnalysisService (Triple Analysis: GPT-4o, Gemini, Perplexity).
  - Added ConsensusService (Strategy Synthesis).
  - Updated workflow.py to orchestrate the new pipeline.

- Phase 3: Delivery & UI
  - Updated StatusDashboard to visualize new workflow steps.
  - Added Consensus Strategy slide to presentation output.
  - Updated JobStatus enum in DB models.
</commit_message>
<xml_diff>
--- a/test/test_presentation.pptx
+++ b/test/test_presentation.pptx
@@ -3091,19 +3091,87 @@
       <p:grpSpPr/>
       <p:sp>
         <p:nvSpPr>
-          <p:cNvPr id="2" name="Title 1"/>
-          <p:cNvSpPr>
-            <a:spLocks noGrp="1"/>
-          </p:cNvSpPr>
-          <p:nvPr>
-            <p:ph type="ctrTitle"/>
-          </p:nvPr>
-        </p:nvSpPr>
-        <p:spPr/>
-        <p:txBody>
-          <a:bodyPr/>
-          <a:lstStyle/>
-          <a:p>
+          <p:cNvPr id="2" name="Rounded Rectangle 1"/>
+          <p:cNvSpPr/>
+          <p:nvPr/>
+        </p:nvSpPr>
+        <p:spPr>
+          <a:xfrm>
+            <a:off x="3200400" y="457200"/>
+            <a:ext cx="2743200" cy="365760"/>
+          </a:xfrm>
+          <a:prstGeom prst="roundRect">
+            <a:avLst/>
+          </a:prstGeom>
+          <a:solidFill>
+            <a:srgbClr val="FFC107"/>
+          </a:solidFill>
+          <a:ln>
+            <a:solidFill>
+              <a:srgbClr val="FFC107"/>
+            </a:solidFill>
+          </a:ln>
+        </p:spPr>
+        <p:style>
+          <a:lnRef idx="1">
+            <a:schemeClr val="accent1"/>
+          </a:lnRef>
+          <a:fillRef idx="3">
+            <a:schemeClr val="accent1"/>
+          </a:fillRef>
+          <a:effectRef idx="2">
+            <a:schemeClr val="accent1"/>
+          </a:effectRef>
+          <a:fontRef idx="minor">
+            <a:schemeClr val="lt1"/>
+          </a:fontRef>
+        </p:style>
+        <p:txBody>
+          <a:bodyPr rtlCol="0" anchor="ctr"/>
+          <a:lstStyle/>
+          <a:p>
+            <a:pPr algn="ctr">
+              <a:defRPr sz="1000" b="1">
+                <a:solidFill>
+                  <a:srgbClr val="000000"/>
+                </a:solidFill>
+              </a:defRPr>
+            </a:pPr>
+            <a:r>
+              <a:t>CONFIDENTIAL STRATEGY DECK</a:t>
+            </a:r>
+          </a:p>
+        </p:txBody>
+      </p:sp>
+      <p:sp>
+        <p:nvSpPr>
+          <p:cNvPr id="3" name="TextBox 2"/>
+          <p:cNvSpPr txBox="1"/>
+          <p:nvPr/>
+        </p:nvSpPr>
+        <p:spPr>
+          <a:xfrm>
+            <a:off x="914400" y="2286000"/>
+            <a:ext cx="7315200" cy="1371600"/>
+          </a:xfrm>
+          <a:prstGeom prst="rect">
+            <a:avLst/>
+          </a:prstGeom>
+          <a:noFill/>
+        </p:spPr>
+        <p:txBody>
+          <a:bodyPr wrap="none">
+            <a:spAutoFit/>
+          </a:bodyPr>
+          <a:lstStyle/>
+          <a:p>
+            <a:pPr algn="ctr">
+              <a:defRPr sz="4800" b="1">
+                <a:solidFill>
+                  <a:srgbClr val="212121"/>
+                </a:solidFill>
+              </a:defRPr>
+            </a:pPr>
             <a:r>
               <a:t>EcoFit Brand Strategy</a:t>
             </a:r>
@@ -3112,25 +3180,106 @@
       </p:sp>
       <p:sp>
         <p:nvSpPr>
-          <p:cNvPr id="3" name="Subtitle 2"/>
-          <p:cNvSpPr>
-            <a:spLocks noGrp="1"/>
-          </p:cNvSpPr>
-          <p:nvPr>
-            <p:ph type="subTitle" idx="1"/>
-          </p:nvPr>
-        </p:nvSpPr>
-        <p:spPr/>
-        <p:txBody>
-          <a:bodyPr/>
-          <a:lstStyle/>
-          <a:p>
+          <p:cNvPr id="4" name="Rectangle 3"/>
+          <p:cNvSpPr/>
+          <p:nvPr/>
+        </p:nvSpPr>
+        <p:spPr>
+          <a:xfrm>
+            <a:off x="914400" y="3840480"/>
+            <a:ext cx="7315200" cy="45720"/>
+          </a:xfrm>
+          <a:prstGeom prst="rect">
+            <a:avLst/>
+          </a:prstGeom>
+          <a:solidFill>
+            <a:srgbClr val="FFC107"/>
+          </a:solidFill>
+          <a:ln>
+            <a:noFill/>
+          </a:ln>
+        </p:spPr>
+        <p:style>
+          <a:lnRef idx="1">
+            <a:schemeClr val="accent1"/>
+          </a:lnRef>
+          <a:fillRef idx="3">
+            <a:schemeClr val="accent1"/>
+          </a:fillRef>
+          <a:effectRef idx="2">
+            <a:schemeClr val="accent1"/>
+          </a:effectRef>
+          <a:fontRef idx="minor">
+            <a:schemeClr val="lt1"/>
+          </a:fontRef>
+        </p:style>
+        <p:txBody>
+          <a:bodyPr rtlCol="0" anchor="ctr"/>
+          <a:lstStyle/>
+          <a:p>
+            <a:pPr algn="ctr"/>
+          </a:p>
+        </p:txBody>
+      </p:sp>
+      <p:sp>
+        <p:nvSpPr>
+          <p:cNvPr id="5" name="TextBox 4"/>
+          <p:cNvSpPr txBox="1"/>
+          <p:nvPr/>
+        </p:nvSpPr>
+        <p:spPr>
+          <a:xfrm>
+            <a:off x="914400" y="4114800"/>
+            <a:ext cx="7315200" cy="457200"/>
+          </a:xfrm>
+          <a:prstGeom prst="rect">
+            <a:avLst/>
+          </a:prstGeom>
+          <a:noFill/>
+        </p:spPr>
+        <p:txBody>
+          <a:bodyPr wrap="none">
+            <a:spAutoFit/>
+          </a:bodyPr>
+          <a:lstStyle/>
+          <a:p>
+            <a:pPr algn="ctr">
+              <a:defRPr sz="1400">
+                <a:solidFill>
+                  <a:srgbClr val="212121"/>
+                </a:solidFill>
+              </a:defRPr>
+            </a:pPr>
             <a:r>
               <a:t>Sustainable Performance</a:t>
             </a:r>
           </a:p>
         </p:txBody>
       </p:sp>
+      <p:pic>
+        <p:nvPicPr>
+          <p:cNvPr id="6" name="Picture 5" descr="yellowHeadLogo.png"/>
+          <p:cNvPicPr>
+            <a:picLocks noChangeAspect="1"/>
+          </p:cNvPicPr>
+          <p:nvPr/>
+        </p:nvPicPr>
+        <p:blipFill>
+          <a:blip r:embed="rId2"/>
+          <a:stretch>
+            <a:fillRect/>
+          </a:stretch>
+        </p:blipFill>
+        <p:spPr>
+          <a:xfrm>
+            <a:off x="457200" y="137160"/>
+            <a:ext cx="1645920" cy="365760"/>
+          </a:xfrm>
+          <a:prstGeom prst="rect">
+            <a:avLst/>
+          </a:prstGeom>
+        </p:spPr>
+      </p:pic>
     </p:spTree>
   </p:cSld>
   <p:clrMapOvr>
@@ -3151,19 +3300,33 @@
       <p:grpSpPr/>
       <p:sp>
         <p:nvSpPr>
-          <p:cNvPr id="2" name="Title 1"/>
-          <p:cNvSpPr>
-            <a:spLocks noGrp="1"/>
-          </p:cNvSpPr>
-          <p:nvPr>
-            <p:ph type="title"/>
-          </p:nvPr>
-        </p:nvSpPr>
-        <p:spPr/>
-        <p:txBody>
-          <a:bodyPr/>
-          <a:lstStyle/>
-          <a:p>
+          <p:cNvPr id="2" name="TextBox 1"/>
+          <p:cNvSpPr txBox="1"/>
+          <p:nvPr/>
+        </p:nvSpPr>
+        <p:spPr>
+          <a:xfrm>
+            <a:off x="457200" y="457200"/>
+            <a:ext cx="8229600" cy="548640"/>
+          </a:xfrm>
+          <a:prstGeom prst="rect">
+            <a:avLst/>
+          </a:prstGeom>
+          <a:noFill/>
+        </p:spPr>
+        <p:txBody>
+          <a:bodyPr wrap="none">
+            <a:spAutoFit/>
+          </a:bodyPr>
+          <a:lstStyle/>
+          <a:p>
+            <a:pPr>
+              <a:defRPr sz="3200" b="1">
+                <a:solidFill>
+                  <a:srgbClr val="212121"/>
+                </a:solidFill>
+              </a:defRPr>
+            </a:pPr>
             <a:r>
               <a:t>The Problem</a:t>
             </a:r>
@@ -3172,37 +3335,133 @@
       </p:sp>
       <p:sp>
         <p:nvSpPr>
-          <p:cNvPr id="3" name="Content Placeholder 2"/>
-          <p:cNvSpPr>
-            <a:spLocks noGrp="1"/>
-          </p:cNvSpPr>
-          <p:nvPr>
-            <p:ph idx="1"/>
-          </p:nvPr>
-        </p:nvSpPr>
-        <p:spPr/>
-        <p:txBody>
-          <a:bodyPr/>
-          <a:lstStyle/>
-          <a:p>
-            <a:r>
-              <a:t>Plastic waste is destroying oceans.</a:t>
-            </a:r>
-          </a:p>
-          <a:p>
-            <a:pPr/>
-            <a:r>
-              <a:t>Gym wear wears out too fast.</a:t>
-            </a:r>
-          </a:p>
-          <a:p>
-            <a:pPr/>
-            <a:r>
-              <a:t>Consumers feel guilty.</a:t>
-            </a:r>
-          </a:p>
-        </p:txBody>
-      </p:sp>
+          <p:cNvPr id="3" name="TextBox 2"/>
+          <p:cNvSpPr txBox="1"/>
+          <p:nvPr/>
+        </p:nvSpPr>
+        <p:spPr>
+          <a:xfrm>
+            <a:off x="640080" y="1371600"/>
+            <a:ext cx="7772400" cy="457200"/>
+          </a:xfrm>
+          <a:prstGeom prst="rect">
+            <a:avLst/>
+          </a:prstGeom>
+          <a:noFill/>
+        </p:spPr>
+        <p:txBody>
+          <a:bodyPr wrap="square">
+            <a:spAutoFit/>
+          </a:bodyPr>
+          <a:lstStyle/>
+          <a:p>
+            <a:pPr>
+              <a:defRPr sz="1200">
+                <a:solidFill>
+                  <a:srgbClr val="212121"/>
+                </a:solidFill>
+              </a:defRPr>
+            </a:pPr>
+            <a:r>
+              <a:t>• Plastic waste is destroying oceans.</a:t>
+            </a:r>
+          </a:p>
+        </p:txBody>
+      </p:sp>
+      <p:sp>
+        <p:nvSpPr>
+          <p:cNvPr id="4" name="TextBox 3"/>
+          <p:cNvSpPr txBox="1"/>
+          <p:nvPr/>
+        </p:nvSpPr>
+        <p:spPr>
+          <a:xfrm>
+            <a:off x="640080" y="2011680"/>
+            <a:ext cx="7772400" cy="457200"/>
+          </a:xfrm>
+          <a:prstGeom prst="rect">
+            <a:avLst/>
+          </a:prstGeom>
+          <a:noFill/>
+        </p:spPr>
+        <p:txBody>
+          <a:bodyPr wrap="square">
+            <a:spAutoFit/>
+          </a:bodyPr>
+          <a:lstStyle/>
+          <a:p>
+            <a:pPr>
+              <a:defRPr sz="1200">
+                <a:solidFill>
+                  <a:srgbClr val="212121"/>
+                </a:solidFill>
+              </a:defRPr>
+            </a:pPr>
+            <a:r>
+              <a:t>• Gym wear wears out too fast.</a:t>
+            </a:r>
+          </a:p>
+        </p:txBody>
+      </p:sp>
+      <p:sp>
+        <p:nvSpPr>
+          <p:cNvPr id="5" name="TextBox 4"/>
+          <p:cNvSpPr txBox="1"/>
+          <p:nvPr/>
+        </p:nvSpPr>
+        <p:spPr>
+          <a:xfrm>
+            <a:off x="640080" y="2651760"/>
+            <a:ext cx="7772400" cy="457200"/>
+          </a:xfrm>
+          <a:prstGeom prst="rect">
+            <a:avLst/>
+          </a:prstGeom>
+          <a:noFill/>
+        </p:spPr>
+        <p:txBody>
+          <a:bodyPr wrap="square">
+            <a:spAutoFit/>
+          </a:bodyPr>
+          <a:lstStyle/>
+          <a:p>
+            <a:pPr>
+              <a:defRPr sz="1200">
+                <a:solidFill>
+                  <a:srgbClr val="212121"/>
+                </a:solidFill>
+              </a:defRPr>
+            </a:pPr>
+            <a:r>
+              <a:t>• Consumers feel guilty.</a:t>
+            </a:r>
+          </a:p>
+        </p:txBody>
+      </p:sp>
+      <p:pic>
+        <p:nvPicPr>
+          <p:cNvPr id="6" name="Picture 5" descr="yellowHeadLogo.png"/>
+          <p:cNvPicPr>
+            <a:picLocks noChangeAspect="1"/>
+          </p:cNvPicPr>
+          <p:nvPr/>
+        </p:nvPicPr>
+        <p:blipFill>
+          <a:blip r:embed="rId2"/>
+          <a:stretch>
+            <a:fillRect/>
+          </a:stretch>
+        </p:blipFill>
+        <p:spPr>
+          <a:xfrm>
+            <a:off x="457200" y="137160"/>
+            <a:ext cx="1645920" cy="365760"/>
+          </a:xfrm>
+          <a:prstGeom prst="rect">
+            <a:avLst/>
+          </a:prstGeom>
+        </p:spPr>
+      </p:pic>
     </p:spTree>
   </p:cSld>
   <p:clrMapOvr>

</xml_diff>